<commit_message>
added figures to boundary conditions
</commit_message>
<xml_diff>
--- a/content/maxwell1_fundamentals/fundamental_laws/images/BC.pptx
+++ b/content/maxwell1_fundamentals/fundamental_laws/images/BC.pptx
@@ -3255,7 +3255,7 @@
         <p:spPr>
           <a:xfrm>
             <a:off x="3857300" y="1940867"/>
-            <a:ext cx="362600" cy="461665"/>
+            <a:ext cx="325730" cy="461665"/>
           </a:xfrm>
           <a:prstGeom prst="rect">
             <a:avLst/>
@@ -3269,8 +3269,8 @@
           <a:lstStyle/>
           <a:p>
             <a:r>
-              <a:rPr lang="en-US" sz="2400" dirty="0" smtClean="0"/>
-              <a:t>A</a:t>
+              <a:rPr lang="en-US" sz="2400" smtClean="0"/>
+              <a:t>S</a:t>
             </a:r>
             <a:endParaRPr lang="en-US" sz="2400" dirty="0"/>
           </a:p>

</xml_diff>

<commit_message>
changes pictures to have lower case j and e
</commit_message>
<xml_diff>
--- a/content/maxwell1_fundamentals/fundamental_laws/images/BC.pptx
+++ b/content/maxwell1_fundamentals/fundamental_laws/images/BC.pptx
@@ -314,7 +314,7 @@
             <a:fld id="{1D8BD707-D9CF-40AE-B4C6-C98DA3205C09}" type="datetimeFigureOut">
               <a:rPr lang="en-US" smtClean="0"/>
               <a:pPr/>
-              <a:t>11/9/2015</a:t>
+              <a:t>11/23/2015</a:t>
             </a:fld>
             <a:endParaRPr lang="en-US"/>
           </a:p>
@@ -481,7 +481,7 @@
             <a:fld id="{1D8BD707-D9CF-40AE-B4C6-C98DA3205C09}" type="datetimeFigureOut">
               <a:rPr lang="en-US" smtClean="0"/>
               <a:pPr/>
-              <a:t>11/9/2015</a:t>
+              <a:t>11/23/2015</a:t>
             </a:fld>
             <a:endParaRPr lang="en-US"/>
           </a:p>
@@ -658,7 +658,7 @@
             <a:fld id="{1D8BD707-D9CF-40AE-B4C6-C98DA3205C09}" type="datetimeFigureOut">
               <a:rPr lang="en-US" smtClean="0"/>
               <a:pPr/>
-              <a:t>11/9/2015</a:t>
+              <a:t>11/23/2015</a:t>
             </a:fld>
             <a:endParaRPr lang="en-US"/>
           </a:p>
@@ -825,7 +825,7 @@
             <a:fld id="{1D8BD707-D9CF-40AE-B4C6-C98DA3205C09}" type="datetimeFigureOut">
               <a:rPr lang="en-US" smtClean="0"/>
               <a:pPr/>
-              <a:t>11/9/2015</a:t>
+              <a:t>11/23/2015</a:t>
             </a:fld>
             <a:endParaRPr lang="en-US"/>
           </a:p>
@@ -1068,7 +1068,7 @@
             <a:fld id="{1D8BD707-D9CF-40AE-B4C6-C98DA3205C09}" type="datetimeFigureOut">
               <a:rPr lang="en-US" smtClean="0"/>
               <a:pPr/>
-              <a:t>11/9/2015</a:t>
+              <a:t>11/23/2015</a:t>
             </a:fld>
             <a:endParaRPr lang="en-US"/>
           </a:p>
@@ -1353,7 +1353,7 @@
             <a:fld id="{1D8BD707-D9CF-40AE-B4C6-C98DA3205C09}" type="datetimeFigureOut">
               <a:rPr lang="en-US" smtClean="0"/>
               <a:pPr/>
-              <a:t>11/9/2015</a:t>
+              <a:t>11/23/2015</a:t>
             </a:fld>
             <a:endParaRPr lang="en-US"/>
           </a:p>
@@ -1772,7 +1772,7 @@
             <a:fld id="{1D8BD707-D9CF-40AE-B4C6-C98DA3205C09}" type="datetimeFigureOut">
               <a:rPr lang="en-US" smtClean="0"/>
               <a:pPr/>
-              <a:t>11/9/2015</a:t>
+              <a:t>11/23/2015</a:t>
             </a:fld>
             <a:endParaRPr lang="en-US"/>
           </a:p>
@@ -1887,7 +1887,7 @@
             <a:fld id="{1D8BD707-D9CF-40AE-B4C6-C98DA3205C09}" type="datetimeFigureOut">
               <a:rPr lang="en-US" smtClean="0"/>
               <a:pPr/>
-              <a:t>11/9/2015</a:t>
+              <a:t>11/23/2015</a:t>
             </a:fld>
             <a:endParaRPr lang="en-US"/>
           </a:p>
@@ -1979,7 +1979,7 @@
             <a:fld id="{1D8BD707-D9CF-40AE-B4C6-C98DA3205C09}" type="datetimeFigureOut">
               <a:rPr lang="en-US" smtClean="0"/>
               <a:pPr/>
-              <a:t>11/9/2015</a:t>
+              <a:t>11/23/2015</a:t>
             </a:fld>
             <a:endParaRPr lang="en-US"/>
           </a:p>
@@ -2253,7 +2253,7 @@
             <a:fld id="{1D8BD707-D9CF-40AE-B4C6-C98DA3205C09}" type="datetimeFigureOut">
               <a:rPr lang="en-US" smtClean="0"/>
               <a:pPr/>
-              <a:t>11/9/2015</a:t>
+              <a:t>11/23/2015</a:t>
             </a:fld>
             <a:endParaRPr lang="en-US"/>
           </a:p>
@@ -2503,7 +2503,7 @@
             <a:fld id="{1D8BD707-D9CF-40AE-B4C6-C98DA3205C09}" type="datetimeFigureOut">
               <a:rPr lang="en-US" smtClean="0"/>
               <a:pPr/>
-              <a:t>11/9/2015</a:t>
+              <a:t>11/23/2015</a:t>
             </a:fld>
             <a:endParaRPr lang="en-US"/>
           </a:p>
@@ -2713,7 +2713,7 @@
             <a:fld id="{1D8BD707-D9CF-40AE-B4C6-C98DA3205C09}" type="datetimeFigureOut">
               <a:rPr lang="en-US" smtClean="0"/>
               <a:pPr/>
-              <a:t>11/9/2015</a:t>
+              <a:t>11/23/2015</a:t>
             </a:fld>
             <a:endParaRPr lang="en-US"/>
           </a:p>
@@ -3675,8 +3675,8 @@
           <a:lstStyle/>
           <a:p>
             <a:r>
-              <a:rPr lang="en-US" sz="2400" b="1" dirty="0" smtClean="0"/>
-              <a:t>E</a:t>
+              <a:rPr lang="en-US" sz="2400" b="1" dirty="0"/>
+              <a:t>e</a:t>
             </a:r>
             <a:r>
               <a:rPr lang="en-US" sz="2400" baseline="-25000" dirty="0" smtClean="0"/>
@@ -3688,7 +3688,11 @@
             </a:r>
             <a:r>
               <a:rPr lang="en-US" sz="2400" b="1" dirty="0" smtClean="0"/>
-              <a:t> J</a:t>
+              <a:t> </a:t>
+            </a:r>
+            <a:r>
+              <a:rPr lang="en-US" sz="2400" b="1" dirty="0"/>
+              <a:t>j</a:t>
             </a:r>
             <a:r>
               <a:rPr lang="en-US" sz="2400" b="1" baseline="-25000" dirty="0" smtClean="0"/>
@@ -3721,11 +3725,11 @@
           <a:lstStyle/>
           <a:p>
             <a:r>
-              <a:rPr lang="en-US" sz="2400" b="1" dirty="0" smtClean="0"/>
-              <a:t>E</a:t>
-            </a:r>
-            <a:r>
-              <a:rPr lang="en-US" sz="2400" baseline="-25000" dirty="0"/>
+              <a:rPr lang="en-US" sz="2400" b="1" dirty="0"/>
+              <a:t>e</a:t>
+            </a:r>
+            <a:r>
+              <a:rPr lang="en-US" sz="2400" baseline="-25000" dirty="0" smtClean="0"/>
               <a:t>2</a:t>
             </a:r>
             <a:r>
@@ -3734,7 +3738,11 @@
             </a:r>
             <a:r>
               <a:rPr lang="en-US" sz="2400" b="1" dirty="0" smtClean="0"/>
-              <a:t> J</a:t>
+              <a:t> </a:t>
+            </a:r>
+            <a:r>
+              <a:rPr lang="en-US" sz="2400" b="1" dirty="0"/>
+              <a:t>j</a:t>
             </a:r>
             <a:r>
               <a:rPr lang="en-US" sz="2400" b="1" baseline="-25000" dirty="0" smtClean="0"/>
@@ -3904,8 +3912,8 @@
           <a:lstStyle/>
           <a:p>
             <a:r>
-              <a:rPr lang="en-US" sz="2400" b="1" dirty="0" smtClean="0"/>
-              <a:t>E</a:t>
+              <a:rPr lang="en-US" sz="2400" b="1" dirty="0"/>
+              <a:t>e</a:t>
             </a:r>
             <a:r>
               <a:rPr lang="en-US" sz="2400" baseline="-25000" dirty="0" smtClean="0"/>
@@ -3942,8 +3950,8 @@
           <a:lstStyle/>
           <a:p>
             <a:r>
-              <a:rPr lang="en-US" sz="2400" b="1" dirty="0" smtClean="0"/>
-              <a:t>E</a:t>
+              <a:rPr lang="en-US" sz="2400" b="1" dirty="0"/>
+              <a:t>e</a:t>
             </a:r>
             <a:r>
               <a:rPr lang="en-US" sz="2400" baseline="-25000" dirty="0" smtClean="0"/>
@@ -4193,8 +4201,8 @@
           <a:lstStyle/>
           <a:p>
             <a:r>
-              <a:rPr lang="en-US" sz="2400" b="1" dirty="0" smtClean="0"/>
-              <a:t>E</a:t>
+              <a:rPr lang="en-US" sz="2400" b="1" dirty="0"/>
+              <a:t>e</a:t>
             </a:r>
             <a:r>
               <a:rPr lang="en-US" sz="2400" baseline="-25000" dirty="0" smtClean="0"/>
@@ -4231,8 +4239,8 @@
           <a:lstStyle/>
           <a:p>
             <a:r>
-              <a:rPr lang="en-US" sz="2400" b="1" dirty="0" smtClean="0"/>
-              <a:t>E</a:t>
+              <a:rPr lang="en-US" sz="2400" b="1" dirty="0"/>
+              <a:t>e</a:t>
             </a:r>
             <a:r>
               <a:rPr lang="en-US" sz="2400" baseline="-25000" dirty="0" smtClean="0"/>
@@ -4447,17 +4455,13 @@
           <a:p>
             <a:r>
               <a:rPr lang="en-US" sz="2400" b="1" dirty="0" err="1" smtClean="0"/>
-              <a:t>J</a:t>
-            </a:r>
-            <a:r>
-              <a:rPr lang="en-US" sz="2400" b="1" baseline="-25000" dirty="0" err="1"/>
+              <a:t>j</a:t>
+            </a:r>
+            <a:r>
+              <a:rPr lang="en-US" sz="2400" b="1" baseline="-25000" dirty="0" err="1" smtClean="0"/>
               <a:t>n</a:t>
             </a:r>
-            <a:r>
-              <a:rPr lang="en-US" sz="2400" b="1" baseline="-25000" dirty="0" smtClean="0"/>
-              <a:t>   </a:t>
-            </a:r>
-            <a:endParaRPr lang="en-US" sz="2400" b="1" dirty="0"/>
+            <a:endParaRPr lang="en-US" sz="2400" b="1" baseline="-25000" dirty="0"/>
           </a:p>
         </p:txBody>
       </p:sp>
@@ -4616,10 +4620,10 @@
           <a:p>
             <a:r>
               <a:rPr lang="en-US" sz="2400" b="1" dirty="0" err="1" smtClean="0"/>
-              <a:t>J</a:t>
-            </a:r>
-            <a:r>
-              <a:rPr lang="en-US" sz="2400" b="1" baseline="-25000" dirty="0" err="1"/>
+              <a:t>j</a:t>
+            </a:r>
+            <a:r>
+              <a:rPr lang="en-US" sz="2400" b="1" baseline="-25000" dirty="0" err="1" smtClean="0"/>
               <a:t>n</a:t>
             </a:r>
             <a:r>

</xml_diff>